<commit_message>
slide on HC neighborhood example
</commit_message>
<xml_diff>
--- a/docs/slides/10/10_optimization.pptx
+++ b/docs/slides/10/10_optimization.pptx
@@ -5,7 +5,7 @@
     <p:sldMasterId id="2147483648" r:id="rId1"/>
   </p:sldMasterIdLst>
   <p:notesMasterIdLst>
-    <p:notesMasterId r:id="rId41"/>
+    <p:notesMasterId r:id="rId42"/>
   </p:notesMasterIdLst>
   <p:sldIdLst>
     <p:sldId id="315" r:id="rId2"/>
@@ -38,15 +38,16 @@
     <p:sldId id="304" r:id="rId29"/>
     <p:sldId id="305" r:id="rId30"/>
     <p:sldId id="306" r:id="rId31"/>
-    <p:sldId id="307" r:id="rId32"/>
-    <p:sldId id="308" r:id="rId33"/>
-    <p:sldId id="309" r:id="rId34"/>
-    <p:sldId id="310" r:id="rId35"/>
-    <p:sldId id="313" r:id="rId36"/>
-    <p:sldId id="311" r:id="rId37"/>
-    <p:sldId id="312" r:id="rId38"/>
-    <p:sldId id="314" r:id="rId39"/>
-    <p:sldId id="316" r:id="rId40"/>
+    <p:sldId id="320" r:id="rId32"/>
+    <p:sldId id="307" r:id="rId33"/>
+    <p:sldId id="308" r:id="rId34"/>
+    <p:sldId id="309" r:id="rId35"/>
+    <p:sldId id="310" r:id="rId36"/>
+    <p:sldId id="313" r:id="rId37"/>
+    <p:sldId id="311" r:id="rId38"/>
+    <p:sldId id="312" r:id="rId39"/>
+    <p:sldId id="314" r:id="rId40"/>
+    <p:sldId id="316" r:id="rId41"/>
   </p:sldIdLst>
   <p:sldSz cx="13004800" cy="9753600"/>
   <p:notesSz cx="6858000" cy="9144000"/>
@@ -2194,7 +2195,7 @@
           </a:ln>
           <a:extLst>
             <a:ext uri="{C572A759-6A51-4108-AA02-DFA0A04FC94B}">
-              <ma14:wrappingTextBoxFlag xmlns="" xmlns:ma14="http://schemas.microsoft.com/office/mac/drawingml/2011/main" val="1"/>
+              <ma14:wrappingTextBoxFlag xmlns:ma14="http://schemas.microsoft.com/office/mac/drawingml/2011/main" xmlns="" val="1"/>
             </a:ext>
           </a:extLst>
         </p:spPr>
@@ -2233,7 +2234,7 @@
           </a:ln>
           <a:extLst>
             <a:ext uri="{C572A759-6A51-4108-AA02-DFA0A04FC94B}">
-              <ma14:wrappingTextBoxFlag xmlns="" xmlns:ma14="http://schemas.microsoft.com/office/mac/drawingml/2011/main" val="1"/>
+              <ma14:wrappingTextBoxFlag xmlns:ma14="http://schemas.microsoft.com/office/mac/drawingml/2011/main" xmlns="" val="1"/>
             </a:ext>
           </a:extLst>
         </p:spPr>
@@ -4717,8 +4718,8 @@
           </a:p>
         </p:txBody>
       </p:sp>
-      <mc:AlternateContent xmlns:mc="http://schemas.openxmlformats.org/markup-compatibility/2006">
-        <mc:Choice xmlns:a14="http://schemas.microsoft.com/office/drawing/2010/main" Requires="a14">
+      <mc:AlternateContent xmlns:mc="http://schemas.openxmlformats.org/markup-compatibility/2006" xmlns:a14="http://schemas.microsoft.com/office/drawing/2010/main">
+        <mc:Choice Requires="a14">
           <p:sp>
             <p:nvSpPr>
               <p:cNvPr id="3" name="Text Placeholder 2">
@@ -4804,7 +4805,7 @@
             </p:txBody>
           </p:sp>
         </mc:Choice>
-        <mc:Fallback>
+        <mc:Fallback xmlns="">
           <p:sp>
             <p:nvSpPr>
               <p:cNvPr id="3" name="Text Placeholder 2">
@@ -11980,6 +11981,1124 @@
       </p:grpSpPr>
       <p:sp>
         <p:nvSpPr>
+          <p:cNvPr id="2" name="Title 1">
+            <a:extLst>
+              <a:ext uri="{FF2B5EF4-FFF2-40B4-BE49-F238E27FC236}">
+                <a16:creationId xmlns:a16="http://schemas.microsoft.com/office/drawing/2014/main" id="{114D593A-BDAD-5540-A193-267EC298831F}"/>
+              </a:ext>
+            </a:extLst>
+          </p:cNvPr>
+          <p:cNvSpPr>
+            <a:spLocks noGrp="1"/>
+          </p:cNvSpPr>
+          <p:nvPr>
+            <p:ph type="title"/>
+          </p:nvPr>
+        </p:nvSpPr>
+        <p:spPr>
+          <a:xfrm>
+            <a:off x="231005" y="97990"/>
+            <a:ext cx="12551343" cy="1268797"/>
+          </a:xfrm>
+        </p:spPr>
+        <p:txBody>
+          <a:bodyPr>
+            <a:normAutofit fontScale="90000"/>
+          </a:bodyPr>
+          <a:lstStyle/>
+          <a:p>
+            <a:r>
+              <a:rPr lang="en-US" dirty="0"/>
+              <a:t>Neighborhood Example</a:t>
+            </a:r>
+          </a:p>
+        </p:txBody>
+      </p:sp>
+      <mc:AlternateContent xmlns:mc="http://schemas.openxmlformats.org/markup-compatibility/2006">
+        <mc:Choice xmlns:a14="http://schemas.microsoft.com/office/drawing/2010/main" Requires="a14">
+          <p:sp>
+            <p:nvSpPr>
+              <p:cNvPr id="3" name="Text Placeholder 2">
+                <a:extLst>
+                  <a:ext uri="{FF2B5EF4-FFF2-40B4-BE49-F238E27FC236}">
+                    <a16:creationId xmlns:a16="http://schemas.microsoft.com/office/drawing/2014/main" id="{86433D7D-74E8-9E48-92B1-B45F5D8CA6ED}"/>
+                  </a:ext>
+                </a:extLst>
+              </p:cNvPr>
+              <p:cNvSpPr>
+                <a:spLocks noGrp="1"/>
+              </p:cNvSpPr>
+              <p:nvPr>
+                <p:ph type="body" idx="1"/>
+              </p:nvPr>
+            </p:nvSpPr>
+            <p:spPr>
+              <a:xfrm>
+                <a:off x="231005" y="6660681"/>
+                <a:ext cx="12551343" cy="2964581"/>
+              </a:xfrm>
+            </p:spPr>
+            <p:txBody>
+              <a:bodyPr>
+                <a:normAutofit fontScale="77500" lnSpcReduction="20000"/>
+              </a:bodyPr>
+              <a:lstStyle/>
+              <a:p>
+                <a:pPr>
+                  <a:spcBef>
+                    <a:spcPts val="2100"/>
+                  </a:spcBef>
+                </a:pPr>
+                <a:r>
+                  <a:rPr lang="en-US" dirty="0"/>
+                  <a:t>Eg, flip 1 bit in a bit-string</a:t>
+                </a:r>
+              </a:p>
+              <a:p>
+                <a:pPr>
+                  <a:spcBef>
+                    <a:spcPts val="2100"/>
+                  </a:spcBef>
+                </a:pPr>
+                <a:r>
+                  <a:rPr lang="en-US" dirty="0"/>
+                  <a:t>Given N bits, search space is </a:t>
+                </a:r>
+                <a14:m>
+                  <m:oMath xmlns:m="http://schemas.openxmlformats.org/officeDocument/2006/math">
+                    <m:sSup>
+                      <m:sSupPr>
+                        <m:ctrlPr>
+                          <a:rPr lang="en-US" i="1" smtClean="0">
+                            <a:latin typeface="Cambria Math" panose="02040503050406030204" pitchFamily="18" charset="0"/>
+                          </a:rPr>
+                        </m:ctrlPr>
+                      </m:sSupPr>
+                      <m:e>
+                        <m:r>
+                          <a:rPr lang="en-US" b="0" i="1" smtClean="0">
+                            <a:latin typeface="Cambria Math" panose="02040503050406030204" pitchFamily="18" charset="0"/>
+                          </a:rPr>
+                          <m:t>2</m:t>
+                        </m:r>
+                      </m:e>
+                      <m:sup>
+                        <m:r>
+                          <a:rPr lang="en-US" b="0" i="1" smtClean="0">
+                            <a:latin typeface="Cambria Math" panose="02040503050406030204" pitchFamily="18" charset="0"/>
+                          </a:rPr>
+                          <m:t>𝑁</m:t>
+                        </m:r>
+                      </m:sup>
+                    </m:sSup>
+                  </m:oMath>
+                </a14:m>
+                <a:r>
+                  <a:rPr lang="en-US" dirty="0"/>
+                  <a:t>, and each neighborhood is composed of N different solutions</a:t>
+                </a:r>
+              </a:p>
+              <a:p>
+                <a:pPr>
+                  <a:spcBef>
+                    <a:spcPts val="2100"/>
+                  </a:spcBef>
+                </a:pPr>
+                <a:r>
+                  <a:rPr lang="en-US" dirty="0"/>
+                  <a:t>Note: could consider larger neighborhoods (</a:t>
+                </a:r>
+                <a:r>
+                  <a:rPr lang="en-US" dirty="0" err="1"/>
+                  <a:t>eg</a:t>
+                </a:r>
+                <a:r>
+                  <a:rPr lang="en-US" dirty="0"/>
+                  <a:t>, flip K bits), but then the neighborhood size would increase significantly</a:t>
+                </a:r>
+              </a:p>
+              <a:p>
+                <a:pPr lvl="1">
+                  <a:spcBef>
+                    <a:spcPts val="2100"/>
+                  </a:spcBef>
+                </a:pPr>
+                <a:r>
+                  <a:rPr lang="en-US" dirty="0"/>
+                  <a:t>this could make each step of HC slower</a:t>
+                </a:r>
+              </a:p>
+            </p:txBody>
+          </p:sp>
+        </mc:Choice>
+        <mc:Fallback>
+          <p:sp>
+            <p:nvSpPr>
+              <p:cNvPr id="3" name="Text Placeholder 2">
+                <a:extLst>
+                  <a:ext uri="{FF2B5EF4-FFF2-40B4-BE49-F238E27FC236}">
+                    <a16:creationId xmlns:a16="http://schemas.microsoft.com/office/drawing/2014/main" id="{86433D7D-74E8-9E48-92B1-B45F5D8CA6ED}"/>
+                  </a:ext>
+                </a:extLst>
+              </p:cNvPr>
+              <p:cNvSpPr>
+                <a:spLocks noGrp="1" noRot="1" noChangeAspect="1" noMove="1" noResize="1" noEditPoints="1" noAdjustHandles="1" noChangeArrowheads="1" noChangeShapeType="1" noTextEdit="1"/>
+              </p:cNvSpPr>
+              <p:nvPr>
+                <p:ph type="body" idx="1"/>
+              </p:nvPr>
+            </p:nvSpPr>
+            <p:spPr>
+              <a:xfrm>
+                <a:off x="231005" y="6660681"/>
+                <a:ext cx="12551343" cy="2964581"/>
+              </a:xfrm>
+              <a:blipFill>
+                <a:blip r:embed="rId2"/>
+                <a:stretch>
+                  <a:fillRect l="-607" t="-2979" r="-404" b="-2128"/>
+                </a:stretch>
+              </a:blipFill>
+            </p:spPr>
+            <p:txBody>
+              <a:bodyPr/>
+              <a:lstStyle/>
+              <a:p>
+                <a:r>
+                  <a:rPr lang="en-US">
+                    <a:noFill/>
+                  </a:rPr>
+                  <a:t> </a:t>
+                </a:r>
+              </a:p>
+            </p:txBody>
+          </p:sp>
+        </mc:Fallback>
+      </mc:AlternateContent>
+      <p:graphicFrame>
+        <p:nvGraphicFramePr>
+          <p:cNvPr id="4" name="Table 3">
+            <a:extLst>
+              <a:ext uri="{FF2B5EF4-FFF2-40B4-BE49-F238E27FC236}">
+                <a16:creationId xmlns:a16="http://schemas.microsoft.com/office/drawing/2014/main" id="{5E057CCF-C1F4-CC4D-B66A-A3E685AA31FA}"/>
+              </a:ext>
+            </a:extLst>
+          </p:cNvPr>
+          <p:cNvGraphicFramePr>
+            <a:graphicFrameLocks noGrp="1"/>
+          </p:cNvGraphicFramePr>
+          <p:nvPr>
+            <p:extLst>
+              <p:ext uri="{D42A27DB-BD31-4B8C-83A1-F6EECF244321}">
+                <p14:modId xmlns:p14="http://schemas.microsoft.com/office/powerpoint/2010/main" val="1700514455"/>
+              </p:ext>
+            </p:extLst>
+          </p:nvPr>
+        </p:nvGraphicFramePr>
+        <p:xfrm>
+          <a:off x="4750602" y="1768042"/>
+          <a:ext cx="3062960" cy="370840"/>
+        </p:xfrm>
+        <a:graphic>
+          <a:graphicData uri="http://schemas.openxmlformats.org/drawingml/2006/table">
+            <a:tbl>
+              <a:tblPr firstRow="1" bandRow="1">
+                <a:tableStyleId>{5940675A-B579-460E-94D1-54222C63F5DA}</a:tableStyleId>
+              </a:tblPr>
+              <a:tblGrid>
+                <a:gridCol w="765740">
+                  <a:extLst>
+                    <a:ext uri="{9D8B030D-6E8A-4147-A177-3AD203B41FA5}">
+                      <a16:colId xmlns:a16="http://schemas.microsoft.com/office/drawing/2014/main" val="2016634412"/>
+                    </a:ext>
+                  </a:extLst>
+                </a:gridCol>
+                <a:gridCol w="765740">
+                  <a:extLst>
+                    <a:ext uri="{9D8B030D-6E8A-4147-A177-3AD203B41FA5}">
+                      <a16:colId xmlns:a16="http://schemas.microsoft.com/office/drawing/2014/main" val="1633594872"/>
+                    </a:ext>
+                  </a:extLst>
+                </a:gridCol>
+                <a:gridCol w="765740">
+                  <a:extLst>
+                    <a:ext uri="{9D8B030D-6E8A-4147-A177-3AD203B41FA5}">
+                      <a16:colId xmlns:a16="http://schemas.microsoft.com/office/drawing/2014/main" val="3679600373"/>
+                    </a:ext>
+                  </a:extLst>
+                </a:gridCol>
+                <a:gridCol w="765740">
+                  <a:extLst>
+                    <a:ext uri="{9D8B030D-6E8A-4147-A177-3AD203B41FA5}">
+                      <a16:colId xmlns:a16="http://schemas.microsoft.com/office/drawing/2014/main" val="743041018"/>
+                    </a:ext>
+                  </a:extLst>
+                </a:gridCol>
+              </a:tblGrid>
+              <a:tr h="370840">
+                <a:tc>
+                  <a:txBody>
+                    <a:bodyPr/>
+                    <a:lstStyle/>
+                    <a:p>
+                      <a:r>
+                        <a:rPr lang="en-US" dirty="0"/>
+                        <a:t>1</a:t>
+                      </a:r>
+                    </a:p>
+                  </a:txBody>
+                  <a:tcPr>
+                    <a:solidFill>
+                      <a:schemeClr val="bg1"/>
+                    </a:solidFill>
+                  </a:tcPr>
+                </a:tc>
+                <a:tc>
+                  <a:txBody>
+                    <a:bodyPr/>
+                    <a:lstStyle/>
+                    <a:p>
+                      <a:r>
+                        <a:rPr lang="en-US" dirty="0"/>
+                        <a:t>1</a:t>
+                      </a:r>
+                    </a:p>
+                  </a:txBody>
+                  <a:tcPr>
+                    <a:solidFill>
+                      <a:schemeClr val="bg1"/>
+                    </a:solidFill>
+                  </a:tcPr>
+                </a:tc>
+                <a:tc>
+                  <a:txBody>
+                    <a:bodyPr/>
+                    <a:lstStyle/>
+                    <a:p>
+                      <a:r>
+                        <a:rPr lang="en-US" dirty="0"/>
+                        <a:t>0</a:t>
+                      </a:r>
+                    </a:p>
+                  </a:txBody>
+                  <a:tcPr>
+                    <a:solidFill>
+                      <a:schemeClr val="bg1"/>
+                    </a:solidFill>
+                  </a:tcPr>
+                </a:tc>
+                <a:tc>
+                  <a:txBody>
+                    <a:bodyPr/>
+                    <a:lstStyle/>
+                    <a:p>
+                      <a:r>
+                        <a:rPr lang="en-US" dirty="0"/>
+                        <a:t>1</a:t>
+                      </a:r>
+                    </a:p>
+                  </a:txBody>
+                  <a:tcPr>
+                    <a:solidFill>
+                      <a:schemeClr val="bg1"/>
+                    </a:solidFill>
+                  </a:tcPr>
+                </a:tc>
+                <a:extLst>
+                  <a:ext uri="{0D108BD9-81ED-4DB2-BD59-A6C34878D82A}">
+                    <a16:rowId xmlns:a16="http://schemas.microsoft.com/office/drawing/2014/main" val="2599666577"/>
+                  </a:ext>
+                </a:extLst>
+              </a:tr>
+            </a:tbl>
+          </a:graphicData>
+        </a:graphic>
+      </p:graphicFrame>
+      <p:cxnSp>
+        <p:nvCxnSpPr>
+          <p:cNvPr id="5" name="Straight Arrow Connector 4">
+            <a:extLst>
+              <a:ext uri="{FF2B5EF4-FFF2-40B4-BE49-F238E27FC236}">
+                <a16:creationId xmlns:a16="http://schemas.microsoft.com/office/drawing/2014/main" id="{3C202AA1-37B9-7E46-B1DB-CEEC463EB810}"/>
+              </a:ext>
+            </a:extLst>
+          </p:cNvPr>
+          <p:cNvCxnSpPr>
+            <a:cxnSpLocks/>
+            <a:stCxn id="4" idx="2"/>
+            <a:endCxn id="9" idx="3"/>
+          </p:cNvCxnSpPr>
+          <p:nvPr/>
+        </p:nvCxnSpPr>
+        <p:spPr>
+          <a:xfrm flipH="1">
+            <a:off x="3812661" y="2138882"/>
+            <a:ext cx="2469421" cy="1179759"/>
+          </a:xfrm>
+          <a:prstGeom prst="straightConnector1">
+            <a:avLst/>
+          </a:prstGeom>
+          <a:noFill/>
+          <a:ln w="50800" cap="flat">
+            <a:solidFill>
+              <a:srgbClr val="000000"/>
+            </a:solidFill>
+            <a:prstDash val="solid"/>
+            <a:miter lim="400000"/>
+            <a:tailEnd type="triangle"/>
+          </a:ln>
+          <a:effectLst/>
+          <a:sp3d/>
+        </p:spPr>
+        <p:style>
+          <a:lnRef idx="0">
+            <a:scrgbClr r="0" g="0" b="0"/>
+          </a:lnRef>
+          <a:fillRef idx="0">
+            <a:scrgbClr r="0" g="0" b="0"/>
+          </a:fillRef>
+          <a:effectRef idx="0">
+            <a:scrgbClr r="0" g="0" b="0"/>
+          </a:effectRef>
+          <a:fontRef idx="none"/>
+        </p:style>
+      </p:cxnSp>
+      <p:graphicFrame>
+        <p:nvGraphicFramePr>
+          <p:cNvPr id="6" name="Table 5">
+            <a:extLst>
+              <a:ext uri="{FF2B5EF4-FFF2-40B4-BE49-F238E27FC236}">
+                <a16:creationId xmlns:a16="http://schemas.microsoft.com/office/drawing/2014/main" id="{8465A453-D130-754B-A3FE-1D110E44B0D1}"/>
+              </a:ext>
+            </a:extLst>
+          </p:cNvPr>
+          <p:cNvGraphicFramePr>
+            <a:graphicFrameLocks noGrp="1"/>
+          </p:cNvGraphicFramePr>
+          <p:nvPr>
+            <p:extLst>
+              <p:ext uri="{D42A27DB-BD31-4B8C-83A1-F6EECF244321}">
+                <p14:modId xmlns:p14="http://schemas.microsoft.com/office/powerpoint/2010/main" val="2136524954"/>
+              </p:ext>
+            </p:extLst>
+          </p:nvPr>
+        </p:nvGraphicFramePr>
+        <p:xfrm>
+          <a:off x="8858985" y="3129679"/>
+          <a:ext cx="3062960" cy="370840"/>
+        </p:xfrm>
+        <a:graphic>
+          <a:graphicData uri="http://schemas.openxmlformats.org/drawingml/2006/table">
+            <a:tbl>
+              <a:tblPr firstRow="1" bandRow="1">
+                <a:tableStyleId>{5940675A-B579-460E-94D1-54222C63F5DA}</a:tableStyleId>
+              </a:tblPr>
+              <a:tblGrid>
+                <a:gridCol w="765740">
+                  <a:extLst>
+                    <a:ext uri="{9D8B030D-6E8A-4147-A177-3AD203B41FA5}">
+                      <a16:colId xmlns:a16="http://schemas.microsoft.com/office/drawing/2014/main" val="2016634412"/>
+                    </a:ext>
+                  </a:extLst>
+                </a:gridCol>
+                <a:gridCol w="765740">
+                  <a:extLst>
+                    <a:ext uri="{9D8B030D-6E8A-4147-A177-3AD203B41FA5}">
+                      <a16:colId xmlns:a16="http://schemas.microsoft.com/office/drawing/2014/main" val="1633594872"/>
+                    </a:ext>
+                  </a:extLst>
+                </a:gridCol>
+                <a:gridCol w="765740">
+                  <a:extLst>
+                    <a:ext uri="{9D8B030D-6E8A-4147-A177-3AD203B41FA5}">
+                      <a16:colId xmlns:a16="http://schemas.microsoft.com/office/drawing/2014/main" val="3679600373"/>
+                    </a:ext>
+                  </a:extLst>
+                </a:gridCol>
+                <a:gridCol w="765740">
+                  <a:extLst>
+                    <a:ext uri="{9D8B030D-6E8A-4147-A177-3AD203B41FA5}">
+                      <a16:colId xmlns:a16="http://schemas.microsoft.com/office/drawing/2014/main" val="743041018"/>
+                    </a:ext>
+                  </a:extLst>
+                </a:gridCol>
+              </a:tblGrid>
+              <a:tr h="370840">
+                <a:tc>
+                  <a:txBody>
+                    <a:bodyPr/>
+                    <a:lstStyle/>
+                    <a:p>
+                      <a:r>
+                        <a:rPr lang="en-US" dirty="0"/>
+                        <a:t>1</a:t>
+                      </a:r>
+                    </a:p>
+                  </a:txBody>
+                  <a:tcPr>
+                    <a:solidFill>
+                      <a:schemeClr val="bg1"/>
+                    </a:solidFill>
+                  </a:tcPr>
+                </a:tc>
+                <a:tc>
+                  <a:txBody>
+                    <a:bodyPr/>
+                    <a:lstStyle/>
+                    <a:p>
+                      <a:r>
+                        <a:rPr lang="en-US" dirty="0"/>
+                        <a:t>1</a:t>
+                      </a:r>
+                    </a:p>
+                  </a:txBody>
+                  <a:tcPr>
+                    <a:solidFill>
+                      <a:schemeClr val="bg1"/>
+                    </a:solidFill>
+                  </a:tcPr>
+                </a:tc>
+                <a:tc>
+                  <a:txBody>
+                    <a:bodyPr/>
+                    <a:lstStyle/>
+                    <a:p>
+                      <a:r>
+                        <a:rPr lang="en-US" dirty="0"/>
+                        <a:t>0</a:t>
+                      </a:r>
+                    </a:p>
+                  </a:txBody>
+                  <a:tcPr>
+                    <a:solidFill>
+                      <a:schemeClr val="bg1"/>
+                    </a:solidFill>
+                  </a:tcPr>
+                </a:tc>
+                <a:tc>
+                  <a:txBody>
+                    <a:bodyPr/>
+                    <a:lstStyle/>
+                    <a:p>
+                      <a:r>
+                        <a:rPr lang="en-US" dirty="0"/>
+                        <a:t>0</a:t>
+                      </a:r>
+                    </a:p>
+                  </a:txBody>
+                  <a:tcPr>
+                    <a:solidFill>
+                      <a:schemeClr val="accent1"/>
+                    </a:solidFill>
+                  </a:tcPr>
+                </a:tc>
+                <a:extLst>
+                  <a:ext uri="{0D108BD9-81ED-4DB2-BD59-A6C34878D82A}">
+                    <a16:rowId xmlns:a16="http://schemas.microsoft.com/office/drawing/2014/main" val="2599666577"/>
+                  </a:ext>
+                </a:extLst>
+              </a:tr>
+            </a:tbl>
+          </a:graphicData>
+        </a:graphic>
+      </p:graphicFrame>
+      <p:graphicFrame>
+        <p:nvGraphicFramePr>
+          <p:cNvPr id="7" name="Table 6">
+            <a:extLst>
+              <a:ext uri="{FF2B5EF4-FFF2-40B4-BE49-F238E27FC236}">
+                <a16:creationId xmlns:a16="http://schemas.microsoft.com/office/drawing/2014/main" id="{9A5BFE24-FA7F-1E4F-A4D8-4B9726AF9363}"/>
+              </a:ext>
+            </a:extLst>
+          </p:cNvPr>
+          <p:cNvGraphicFramePr>
+            <a:graphicFrameLocks noGrp="1"/>
+          </p:cNvGraphicFramePr>
+          <p:nvPr>
+            <p:extLst>
+              <p:ext uri="{D42A27DB-BD31-4B8C-83A1-F6EECF244321}">
+                <p14:modId xmlns:p14="http://schemas.microsoft.com/office/powerpoint/2010/main" val="592710196"/>
+              </p:ext>
+            </p:extLst>
+          </p:nvPr>
+        </p:nvGraphicFramePr>
+        <p:xfrm>
+          <a:off x="6570839" y="3935419"/>
+          <a:ext cx="3062960" cy="370840"/>
+        </p:xfrm>
+        <a:graphic>
+          <a:graphicData uri="http://schemas.openxmlformats.org/drawingml/2006/table">
+            <a:tbl>
+              <a:tblPr firstRow="1" bandRow="1">
+                <a:tableStyleId>{5940675A-B579-460E-94D1-54222C63F5DA}</a:tableStyleId>
+              </a:tblPr>
+              <a:tblGrid>
+                <a:gridCol w="765740">
+                  <a:extLst>
+                    <a:ext uri="{9D8B030D-6E8A-4147-A177-3AD203B41FA5}">
+                      <a16:colId xmlns:a16="http://schemas.microsoft.com/office/drawing/2014/main" val="2016634412"/>
+                    </a:ext>
+                  </a:extLst>
+                </a:gridCol>
+                <a:gridCol w="765740">
+                  <a:extLst>
+                    <a:ext uri="{9D8B030D-6E8A-4147-A177-3AD203B41FA5}">
+                      <a16:colId xmlns:a16="http://schemas.microsoft.com/office/drawing/2014/main" val="1633594872"/>
+                    </a:ext>
+                  </a:extLst>
+                </a:gridCol>
+                <a:gridCol w="765740">
+                  <a:extLst>
+                    <a:ext uri="{9D8B030D-6E8A-4147-A177-3AD203B41FA5}">
+                      <a16:colId xmlns:a16="http://schemas.microsoft.com/office/drawing/2014/main" val="3679600373"/>
+                    </a:ext>
+                  </a:extLst>
+                </a:gridCol>
+                <a:gridCol w="765740">
+                  <a:extLst>
+                    <a:ext uri="{9D8B030D-6E8A-4147-A177-3AD203B41FA5}">
+                      <a16:colId xmlns:a16="http://schemas.microsoft.com/office/drawing/2014/main" val="743041018"/>
+                    </a:ext>
+                  </a:extLst>
+                </a:gridCol>
+              </a:tblGrid>
+              <a:tr h="370840">
+                <a:tc>
+                  <a:txBody>
+                    <a:bodyPr/>
+                    <a:lstStyle/>
+                    <a:p>
+                      <a:r>
+                        <a:rPr lang="en-US" dirty="0"/>
+                        <a:t>1</a:t>
+                      </a:r>
+                    </a:p>
+                  </a:txBody>
+                  <a:tcPr>
+                    <a:solidFill>
+                      <a:schemeClr val="bg1"/>
+                    </a:solidFill>
+                  </a:tcPr>
+                </a:tc>
+                <a:tc>
+                  <a:txBody>
+                    <a:bodyPr/>
+                    <a:lstStyle/>
+                    <a:p>
+                      <a:r>
+                        <a:rPr lang="en-US" dirty="0"/>
+                        <a:t>1</a:t>
+                      </a:r>
+                    </a:p>
+                  </a:txBody>
+                  <a:tcPr>
+                    <a:solidFill>
+                      <a:schemeClr val="bg1"/>
+                    </a:solidFill>
+                  </a:tcPr>
+                </a:tc>
+                <a:tc>
+                  <a:txBody>
+                    <a:bodyPr/>
+                    <a:lstStyle/>
+                    <a:p>
+                      <a:r>
+                        <a:rPr lang="en-US" dirty="0"/>
+                        <a:t>1</a:t>
+                      </a:r>
+                    </a:p>
+                  </a:txBody>
+                  <a:tcPr>
+                    <a:solidFill>
+                      <a:schemeClr val="accent1"/>
+                    </a:solidFill>
+                  </a:tcPr>
+                </a:tc>
+                <a:tc>
+                  <a:txBody>
+                    <a:bodyPr/>
+                    <a:lstStyle/>
+                    <a:p>
+                      <a:r>
+                        <a:rPr lang="en-US" dirty="0"/>
+                        <a:t>1</a:t>
+                      </a:r>
+                    </a:p>
+                  </a:txBody>
+                  <a:tcPr>
+                    <a:solidFill>
+                      <a:schemeClr val="bg1"/>
+                    </a:solidFill>
+                  </a:tcPr>
+                </a:tc>
+                <a:extLst>
+                  <a:ext uri="{0D108BD9-81ED-4DB2-BD59-A6C34878D82A}">
+                    <a16:rowId xmlns:a16="http://schemas.microsoft.com/office/drawing/2014/main" val="2599666577"/>
+                  </a:ext>
+                </a:extLst>
+              </a:tr>
+            </a:tbl>
+          </a:graphicData>
+        </a:graphic>
+      </p:graphicFrame>
+      <p:graphicFrame>
+        <p:nvGraphicFramePr>
+          <p:cNvPr id="8" name="Table 7">
+            <a:extLst>
+              <a:ext uri="{FF2B5EF4-FFF2-40B4-BE49-F238E27FC236}">
+                <a16:creationId xmlns:a16="http://schemas.microsoft.com/office/drawing/2014/main" id="{3CE29F38-427A-6649-8AC2-7760269AFEDF}"/>
+              </a:ext>
+            </a:extLst>
+          </p:cNvPr>
+          <p:cNvGraphicFramePr>
+            <a:graphicFrameLocks noGrp="1"/>
+          </p:cNvGraphicFramePr>
+          <p:nvPr>
+            <p:extLst>
+              <p:ext uri="{D42A27DB-BD31-4B8C-83A1-F6EECF244321}">
+                <p14:modId xmlns:p14="http://schemas.microsoft.com/office/powerpoint/2010/main" val="989240659"/>
+              </p:ext>
+            </p:extLst>
+          </p:nvPr>
+        </p:nvGraphicFramePr>
+        <p:xfrm>
+          <a:off x="3036243" y="3940074"/>
+          <a:ext cx="3062960" cy="370840"/>
+        </p:xfrm>
+        <a:graphic>
+          <a:graphicData uri="http://schemas.openxmlformats.org/drawingml/2006/table">
+            <a:tbl>
+              <a:tblPr firstRow="1" bandRow="1">
+                <a:tableStyleId>{5940675A-B579-460E-94D1-54222C63F5DA}</a:tableStyleId>
+              </a:tblPr>
+              <a:tblGrid>
+                <a:gridCol w="765740">
+                  <a:extLst>
+                    <a:ext uri="{9D8B030D-6E8A-4147-A177-3AD203B41FA5}">
+                      <a16:colId xmlns:a16="http://schemas.microsoft.com/office/drawing/2014/main" val="2016634412"/>
+                    </a:ext>
+                  </a:extLst>
+                </a:gridCol>
+                <a:gridCol w="765740">
+                  <a:extLst>
+                    <a:ext uri="{9D8B030D-6E8A-4147-A177-3AD203B41FA5}">
+                      <a16:colId xmlns:a16="http://schemas.microsoft.com/office/drawing/2014/main" val="1633594872"/>
+                    </a:ext>
+                  </a:extLst>
+                </a:gridCol>
+                <a:gridCol w="765740">
+                  <a:extLst>
+                    <a:ext uri="{9D8B030D-6E8A-4147-A177-3AD203B41FA5}">
+                      <a16:colId xmlns:a16="http://schemas.microsoft.com/office/drawing/2014/main" val="3679600373"/>
+                    </a:ext>
+                  </a:extLst>
+                </a:gridCol>
+                <a:gridCol w="765740">
+                  <a:extLst>
+                    <a:ext uri="{9D8B030D-6E8A-4147-A177-3AD203B41FA5}">
+                      <a16:colId xmlns:a16="http://schemas.microsoft.com/office/drawing/2014/main" val="743041018"/>
+                    </a:ext>
+                  </a:extLst>
+                </a:gridCol>
+              </a:tblGrid>
+              <a:tr h="370840">
+                <a:tc>
+                  <a:txBody>
+                    <a:bodyPr/>
+                    <a:lstStyle/>
+                    <a:p>
+                      <a:r>
+                        <a:rPr lang="en-US" dirty="0"/>
+                        <a:t>1</a:t>
+                      </a:r>
+                    </a:p>
+                  </a:txBody>
+                  <a:tcPr>
+                    <a:solidFill>
+                      <a:schemeClr val="bg1"/>
+                    </a:solidFill>
+                  </a:tcPr>
+                </a:tc>
+                <a:tc>
+                  <a:txBody>
+                    <a:bodyPr/>
+                    <a:lstStyle/>
+                    <a:p>
+                      <a:r>
+                        <a:rPr lang="en-US" dirty="0"/>
+                        <a:t>0</a:t>
+                      </a:r>
+                    </a:p>
+                  </a:txBody>
+                  <a:tcPr>
+                    <a:solidFill>
+                      <a:schemeClr val="accent1"/>
+                    </a:solidFill>
+                  </a:tcPr>
+                </a:tc>
+                <a:tc>
+                  <a:txBody>
+                    <a:bodyPr/>
+                    <a:lstStyle/>
+                    <a:p>
+                      <a:r>
+                        <a:rPr lang="en-US" dirty="0"/>
+                        <a:t>0</a:t>
+                      </a:r>
+                    </a:p>
+                  </a:txBody>
+                  <a:tcPr>
+                    <a:solidFill>
+                      <a:schemeClr val="bg1"/>
+                    </a:solidFill>
+                  </a:tcPr>
+                </a:tc>
+                <a:tc>
+                  <a:txBody>
+                    <a:bodyPr/>
+                    <a:lstStyle/>
+                    <a:p>
+                      <a:r>
+                        <a:rPr lang="en-US" dirty="0"/>
+                        <a:t>1</a:t>
+                      </a:r>
+                    </a:p>
+                  </a:txBody>
+                  <a:tcPr>
+                    <a:solidFill>
+                      <a:schemeClr val="bg1"/>
+                    </a:solidFill>
+                  </a:tcPr>
+                </a:tc>
+                <a:extLst>
+                  <a:ext uri="{0D108BD9-81ED-4DB2-BD59-A6C34878D82A}">
+                    <a16:rowId xmlns:a16="http://schemas.microsoft.com/office/drawing/2014/main" val="2599666577"/>
+                  </a:ext>
+                </a:extLst>
+              </a:tr>
+            </a:tbl>
+          </a:graphicData>
+        </a:graphic>
+      </p:graphicFrame>
+      <p:graphicFrame>
+        <p:nvGraphicFramePr>
+          <p:cNvPr id="9" name="Table 8">
+            <a:extLst>
+              <a:ext uri="{FF2B5EF4-FFF2-40B4-BE49-F238E27FC236}">
+                <a16:creationId xmlns:a16="http://schemas.microsoft.com/office/drawing/2014/main" id="{00B330CC-F267-224F-BEC2-8E42EE170AF3}"/>
+              </a:ext>
+            </a:extLst>
+          </p:cNvPr>
+          <p:cNvGraphicFramePr>
+            <a:graphicFrameLocks noGrp="1"/>
+          </p:cNvGraphicFramePr>
+          <p:nvPr>
+            <p:extLst>
+              <p:ext uri="{D42A27DB-BD31-4B8C-83A1-F6EECF244321}">
+                <p14:modId xmlns:p14="http://schemas.microsoft.com/office/powerpoint/2010/main" val="2533084302"/>
+              </p:ext>
+            </p:extLst>
+          </p:nvPr>
+        </p:nvGraphicFramePr>
+        <p:xfrm>
+          <a:off x="749701" y="3133221"/>
+          <a:ext cx="3062960" cy="370840"/>
+        </p:xfrm>
+        <a:graphic>
+          <a:graphicData uri="http://schemas.openxmlformats.org/drawingml/2006/table">
+            <a:tbl>
+              <a:tblPr firstRow="1" bandRow="1">
+                <a:tableStyleId>{5940675A-B579-460E-94D1-54222C63F5DA}</a:tableStyleId>
+              </a:tblPr>
+              <a:tblGrid>
+                <a:gridCol w="765740">
+                  <a:extLst>
+                    <a:ext uri="{9D8B030D-6E8A-4147-A177-3AD203B41FA5}">
+                      <a16:colId xmlns:a16="http://schemas.microsoft.com/office/drawing/2014/main" val="2016634412"/>
+                    </a:ext>
+                  </a:extLst>
+                </a:gridCol>
+                <a:gridCol w="765740">
+                  <a:extLst>
+                    <a:ext uri="{9D8B030D-6E8A-4147-A177-3AD203B41FA5}">
+                      <a16:colId xmlns:a16="http://schemas.microsoft.com/office/drawing/2014/main" val="1633594872"/>
+                    </a:ext>
+                  </a:extLst>
+                </a:gridCol>
+                <a:gridCol w="765740">
+                  <a:extLst>
+                    <a:ext uri="{9D8B030D-6E8A-4147-A177-3AD203B41FA5}">
+                      <a16:colId xmlns:a16="http://schemas.microsoft.com/office/drawing/2014/main" val="3679600373"/>
+                    </a:ext>
+                  </a:extLst>
+                </a:gridCol>
+                <a:gridCol w="765740">
+                  <a:extLst>
+                    <a:ext uri="{9D8B030D-6E8A-4147-A177-3AD203B41FA5}">
+                      <a16:colId xmlns:a16="http://schemas.microsoft.com/office/drawing/2014/main" val="743041018"/>
+                    </a:ext>
+                  </a:extLst>
+                </a:gridCol>
+              </a:tblGrid>
+              <a:tr h="370840">
+                <a:tc>
+                  <a:txBody>
+                    <a:bodyPr/>
+                    <a:lstStyle/>
+                    <a:p>
+                      <a:r>
+                        <a:rPr lang="en-US" dirty="0"/>
+                        <a:t>0</a:t>
+                      </a:r>
+                    </a:p>
+                  </a:txBody>
+                  <a:tcPr>
+                    <a:solidFill>
+                      <a:schemeClr val="accent1"/>
+                    </a:solidFill>
+                  </a:tcPr>
+                </a:tc>
+                <a:tc>
+                  <a:txBody>
+                    <a:bodyPr/>
+                    <a:lstStyle/>
+                    <a:p>
+                      <a:r>
+                        <a:rPr lang="en-US" dirty="0"/>
+                        <a:t>1</a:t>
+                      </a:r>
+                    </a:p>
+                  </a:txBody>
+                  <a:tcPr>
+                    <a:solidFill>
+                      <a:schemeClr val="bg1"/>
+                    </a:solidFill>
+                  </a:tcPr>
+                </a:tc>
+                <a:tc>
+                  <a:txBody>
+                    <a:bodyPr/>
+                    <a:lstStyle/>
+                    <a:p>
+                      <a:r>
+                        <a:rPr lang="en-US" dirty="0"/>
+                        <a:t>0</a:t>
+                      </a:r>
+                    </a:p>
+                  </a:txBody>
+                  <a:tcPr>
+                    <a:solidFill>
+                      <a:schemeClr val="bg1"/>
+                    </a:solidFill>
+                  </a:tcPr>
+                </a:tc>
+                <a:tc>
+                  <a:txBody>
+                    <a:bodyPr/>
+                    <a:lstStyle/>
+                    <a:p>
+                      <a:r>
+                        <a:rPr lang="en-US" dirty="0"/>
+                        <a:t>1</a:t>
+                      </a:r>
+                    </a:p>
+                  </a:txBody>
+                  <a:tcPr>
+                    <a:solidFill>
+                      <a:schemeClr val="bg1"/>
+                    </a:solidFill>
+                  </a:tcPr>
+                </a:tc>
+                <a:extLst>
+                  <a:ext uri="{0D108BD9-81ED-4DB2-BD59-A6C34878D82A}">
+                    <a16:rowId xmlns:a16="http://schemas.microsoft.com/office/drawing/2014/main" val="2599666577"/>
+                  </a:ext>
+                </a:extLst>
+              </a:tr>
+            </a:tbl>
+          </a:graphicData>
+        </a:graphic>
+      </p:graphicFrame>
+      <p:cxnSp>
+        <p:nvCxnSpPr>
+          <p:cNvPr id="12" name="Straight Arrow Connector 11">
+            <a:extLst>
+              <a:ext uri="{FF2B5EF4-FFF2-40B4-BE49-F238E27FC236}">
+                <a16:creationId xmlns:a16="http://schemas.microsoft.com/office/drawing/2014/main" id="{99374805-943B-AD4B-BE8C-D3D2F1A7372E}"/>
+              </a:ext>
+            </a:extLst>
+          </p:cNvPr>
+          <p:cNvCxnSpPr>
+            <a:cxnSpLocks/>
+            <a:stCxn id="4" idx="2"/>
+            <a:endCxn id="8" idx="0"/>
+          </p:cNvCxnSpPr>
+          <p:nvPr/>
+        </p:nvCxnSpPr>
+        <p:spPr>
+          <a:xfrm flipH="1">
+            <a:off x="4567723" y="2138882"/>
+            <a:ext cx="1714359" cy="1801192"/>
+          </a:xfrm>
+          <a:prstGeom prst="straightConnector1">
+            <a:avLst/>
+          </a:prstGeom>
+          <a:noFill/>
+          <a:ln w="50800" cap="flat">
+            <a:solidFill>
+              <a:srgbClr val="000000"/>
+            </a:solidFill>
+            <a:prstDash val="solid"/>
+            <a:miter lim="400000"/>
+            <a:tailEnd type="triangle"/>
+          </a:ln>
+          <a:effectLst/>
+          <a:sp3d/>
+        </p:spPr>
+        <p:style>
+          <a:lnRef idx="0">
+            <a:scrgbClr r="0" g="0" b="0"/>
+          </a:lnRef>
+          <a:fillRef idx="0">
+            <a:scrgbClr r="0" g="0" b="0"/>
+          </a:fillRef>
+          <a:effectRef idx="0">
+            <a:scrgbClr r="0" g="0" b="0"/>
+          </a:effectRef>
+          <a:fontRef idx="none"/>
+        </p:style>
+      </p:cxnSp>
+      <p:cxnSp>
+        <p:nvCxnSpPr>
+          <p:cNvPr id="13" name="Straight Arrow Connector 12">
+            <a:extLst>
+              <a:ext uri="{FF2B5EF4-FFF2-40B4-BE49-F238E27FC236}">
+                <a16:creationId xmlns:a16="http://schemas.microsoft.com/office/drawing/2014/main" id="{35A9C669-ADCB-6141-8182-E473FCBD73A2}"/>
+              </a:ext>
+            </a:extLst>
+          </p:cNvPr>
+          <p:cNvCxnSpPr>
+            <a:cxnSpLocks/>
+            <a:stCxn id="4" idx="2"/>
+            <a:endCxn id="7" idx="0"/>
+          </p:cNvCxnSpPr>
+          <p:nvPr/>
+        </p:nvCxnSpPr>
+        <p:spPr>
+          <a:xfrm>
+            <a:off x="6282082" y="2138882"/>
+            <a:ext cx="1820237" cy="1796537"/>
+          </a:xfrm>
+          <a:prstGeom prst="straightConnector1">
+            <a:avLst/>
+          </a:prstGeom>
+          <a:noFill/>
+          <a:ln w="50800" cap="flat">
+            <a:solidFill>
+              <a:srgbClr val="000000"/>
+            </a:solidFill>
+            <a:prstDash val="solid"/>
+            <a:miter lim="400000"/>
+            <a:tailEnd type="triangle"/>
+          </a:ln>
+          <a:effectLst/>
+          <a:sp3d/>
+        </p:spPr>
+        <p:style>
+          <a:lnRef idx="0">
+            <a:scrgbClr r="0" g="0" b="0"/>
+          </a:lnRef>
+          <a:fillRef idx="0">
+            <a:scrgbClr r="0" g="0" b="0"/>
+          </a:fillRef>
+          <a:effectRef idx="0">
+            <a:scrgbClr r="0" g="0" b="0"/>
+          </a:effectRef>
+          <a:fontRef idx="none"/>
+        </p:style>
+      </p:cxnSp>
+      <p:cxnSp>
+        <p:nvCxnSpPr>
+          <p:cNvPr id="14" name="Straight Arrow Connector 13">
+            <a:extLst>
+              <a:ext uri="{FF2B5EF4-FFF2-40B4-BE49-F238E27FC236}">
+                <a16:creationId xmlns:a16="http://schemas.microsoft.com/office/drawing/2014/main" id="{0A6ED5D2-A9F0-A14A-B7BC-9A83FCDACFDC}"/>
+              </a:ext>
+            </a:extLst>
+          </p:cNvPr>
+          <p:cNvCxnSpPr>
+            <a:cxnSpLocks/>
+            <a:stCxn id="4" idx="2"/>
+            <a:endCxn id="6" idx="1"/>
+          </p:cNvCxnSpPr>
+          <p:nvPr/>
+        </p:nvCxnSpPr>
+        <p:spPr>
+          <a:xfrm>
+            <a:off x="6282082" y="2138882"/>
+            <a:ext cx="2576903" cy="1176217"/>
+          </a:xfrm>
+          <a:prstGeom prst="straightConnector1">
+            <a:avLst/>
+          </a:prstGeom>
+          <a:noFill/>
+          <a:ln w="50800" cap="flat">
+            <a:solidFill>
+              <a:srgbClr val="000000"/>
+            </a:solidFill>
+            <a:prstDash val="solid"/>
+            <a:miter lim="400000"/>
+            <a:tailEnd type="triangle"/>
+          </a:ln>
+          <a:effectLst/>
+          <a:sp3d/>
+        </p:spPr>
+        <p:style>
+          <a:lnRef idx="0">
+            <a:scrgbClr r="0" g="0" b="0"/>
+          </a:lnRef>
+          <a:fillRef idx="0">
+            <a:scrgbClr r="0" g="0" b="0"/>
+          </a:fillRef>
+          <a:effectRef idx="0">
+            <a:scrgbClr r="0" g="0" b="0"/>
+          </a:effectRef>
+          <a:fontRef idx="none"/>
+        </p:style>
+      </p:cxnSp>
+    </p:spTree>
+    <p:extLst>
+      <p:ext uri="{BB962C8B-B14F-4D97-AF65-F5344CB8AC3E}">
+        <p14:creationId xmlns:p14="http://schemas.microsoft.com/office/powerpoint/2010/main" val="1945703230"/>
+      </p:ext>
+    </p:extLst>
+  </p:cSld>
+  <p:clrMapOvr>
+    <a:masterClrMapping/>
+  </p:clrMapOvr>
+  <p:transition spd="med"/>
+</p:sld>
+</file>
+
+<file path=ppt/slides/slide32.xml><?xml version="1.0" encoding="utf-8"?>
+<p:sld xmlns:a="http://schemas.openxmlformats.org/drawingml/2006/main" xmlns:r="http://schemas.openxmlformats.org/officeDocument/2006/relationships" xmlns:p="http://schemas.openxmlformats.org/presentationml/2006/main">
+  <p:cSld>
+    <p:spTree>
+      <p:nvGrpSpPr>
+        <p:cNvPr id="1" name=""/>
+        <p:cNvGrpSpPr/>
+        <p:nvPr/>
+      </p:nvGrpSpPr>
+      <p:grpSpPr>
+        <a:xfrm>
+          <a:off x="0" y="0"/>
+          <a:ext cx="0" cy="0"/>
+          <a:chOff x="0" y="0"/>
+          <a:chExt cx="0" cy="0"/>
+        </a:xfrm>
+      </p:grpSpPr>
+      <p:sp>
+        <p:nvSpPr>
           <p:cNvPr id="2" name="Title 1"/>
           <p:cNvSpPr>
             <a:spLocks noGrp="1"/>
@@ -12107,7 +13226,7 @@
 </p:sld>
 </file>
 
-<file path=ppt/slides/slide32.xml><?xml version="1.0" encoding="utf-8"?>
+<file path=ppt/slides/slide33.xml><?xml version="1.0" encoding="utf-8"?>
 <p:sld xmlns:a="http://schemas.openxmlformats.org/drawingml/2006/main" xmlns:r="http://schemas.openxmlformats.org/officeDocument/2006/relationships" xmlns:p="http://schemas.openxmlformats.org/presentationml/2006/main">
   <p:cSld>
     <p:spTree>
@@ -12234,7 +13353,7 @@
 </p:sld>
 </file>
 
-<file path=ppt/slides/slide33.xml><?xml version="1.0" encoding="utf-8"?>
+<file path=ppt/slides/slide34.xml><?xml version="1.0" encoding="utf-8"?>
 <p:sld xmlns:a="http://schemas.openxmlformats.org/drawingml/2006/main" xmlns:r="http://schemas.openxmlformats.org/officeDocument/2006/relationships" xmlns:p="http://schemas.openxmlformats.org/presentationml/2006/main">
   <p:cSld>
     <p:spTree>
@@ -12644,7 +13763,7 @@
 </p:sld>
 </file>
 
-<file path=ppt/slides/slide34.xml><?xml version="1.0" encoding="utf-8"?>
+<file path=ppt/slides/slide35.xml><?xml version="1.0" encoding="utf-8"?>
 <p:sld xmlns:a="http://schemas.openxmlformats.org/drawingml/2006/main" xmlns:r="http://schemas.openxmlformats.org/officeDocument/2006/relationships" xmlns:p="http://schemas.openxmlformats.org/presentationml/2006/main">
   <p:cSld>
     <p:spTree>
@@ -12772,7 +13891,7 @@
 </p:sld>
 </file>
 
-<file path=ppt/slides/slide35.xml><?xml version="1.0" encoding="utf-8"?>
+<file path=ppt/slides/slide36.xml><?xml version="1.0" encoding="utf-8"?>
 <p:sld xmlns:a="http://schemas.openxmlformats.org/drawingml/2006/main" xmlns:r="http://schemas.openxmlformats.org/officeDocument/2006/relationships" xmlns:p="http://schemas.openxmlformats.org/presentationml/2006/main">
   <p:cSld>
     <p:spTree>
@@ -12974,134 +14093,6 @@
 </p:sld>
 </file>
 
-<file path=ppt/slides/slide36.xml><?xml version="1.0" encoding="utf-8"?>
-<p:sld xmlns:a="http://schemas.openxmlformats.org/drawingml/2006/main" xmlns:r="http://schemas.openxmlformats.org/officeDocument/2006/relationships" xmlns:p="http://schemas.openxmlformats.org/presentationml/2006/main">
-  <p:cSld>
-    <p:spTree>
-      <p:nvGrpSpPr>
-        <p:cNvPr id="1" name=""/>
-        <p:cNvGrpSpPr/>
-        <p:nvPr/>
-      </p:nvGrpSpPr>
-      <p:grpSpPr>
-        <a:xfrm>
-          <a:off x="0" y="0"/>
-          <a:ext cx="0" cy="0"/>
-          <a:chOff x="0" y="0"/>
-          <a:chExt cx="0" cy="0"/>
-        </a:xfrm>
-      </p:grpSpPr>
-      <p:sp>
-        <p:nvSpPr>
-          <p:cNvPr id="2" name="Title 1"/>
-          <p:cNvSpPr>
-            <a:spLocks noGrp="1"/>
-          </p:cNvSpPr>
-          <p:nvPr>
-            <p:ph type="title"/>
-          </p:nvPr>
-        </p:nvSpPr>
-        <p:spPr/>
-        <p:txBody>
-          <a:bodyPr/>
-          <a:lstStyle/>
-          <a:p>
-            <a:r>
-              <a:rPr lang="en-US" dirty="0"/>
-              <a:t>Decision Problem</a:t>
-            </a:r>
-          </a:p>
-        </p:txBody>
-      </p:sp>
-      <p:sp>
-        <p:nvSpPr>
-          <p:cNvPr id="3" name="Text Placeholder 2"/>
-          <p:cNvSpPr>
-            <a:spLocks noGrp="1"/>
-          </p:cNvSpPr>
-          <p:nvPr>
-            <p:ph type="body" idx="1"/>
-          </p:nvPr>
-        </p:nvSpPr>
-        <p:spPr>
-          <a:xfrm>
-            <a:off x="296091" y="2603499"/>
-            <a:ext cx="12557760" cy="6714671"/>
-          </a:xfrm>
-        </p:spPr>
-        <p:txBody>
-          <a:bodyPr>
-            <a:normAutofit fontScale="77500" lnSpcReduction="20000"/>
-          </a:bodyPr>
-          <a:lstStyle/>
-          <a:p>
-            <a:r>
-              <a:rPr lang="en-US" dirty="0"/>
-              <a:t>Technically, QP is a </a:t>
-            </a:r>
-            <a:r>
-              <a:rPr lang="en-US" i="1" dirty="0"/>
-              <a:t>decision</a:t>
-            </a:r>
-            <a:r>
-              <a:rPr lang="en-US" dirty="0"/>
-              <a:t> problem</a:t>
-            </a:r>
-          </a:p>
-          <a:p>
-            <a:r>
-              <a:rPr lang="en-US" dirty="0"/>
-              <a:t>Once we find a solution with N queens no threating any other, we know we have found a global optimum</a:t>
-            </a:r>
-          </a:p>
-          <a:p>
-            <a:r>
-              <a:rPr lang="en-US" dirty="0"/>
-              <a:t>In optimization problems, usually we cannot know if we found the best</a:t>
-            </a:r>
-          </a:p>
-          <a:p>
-            <a:r>
-              <a:rPr lang="en-US" dirty="0"/>
-              <a:t>Decision Problem: can say “yes” or “no” about if a solution is optimal or not</a:t>
-            </a:r>
-          </a:p>
-          <a:p>
-            <a:r>
-              <a:rPr lang="en-US" dirty="0"/>
-              <a:t>For decision problems, still doing the same as optimization, only difference is that we can know when best solution is found</a:t>
-            </a:r>
-          </a:p>
-          <a:p>
-            <a:r>
-              <a:rPr lang="en-US" dirty="0"/>
-              <a:t>Practically all optimization problems have a decision variant for some metric K, </a:t>
-            </a:r>
-            <a:r>
-              <a:rPr lang="en-US" dirty="0" err="1"/>
-              <a:t>eg</a:t>
-            </a:r>
-            <a:r>
-              <a:rPr lang="en-US" dirty="0"/>
-              <a:t> “find knapsack configuration with total item values of at least K”</a:t>
-            </a:r>
-          </a:p>
-        </p:txBody>
-      </p:sp>
-    </p:spTree>
-    <p:extLst>
-      <p:ext uri="{BB962C8B-B14F-4D97-AF65-F5344CB8AC3E}">
-        <p14:creationId xmlns:p14="http://schemas.microsoft.com/office/powerpoint/2010/main" val="63164798"/>
-      </p:ext>
-    </p:extLst>
-  </p:cSld>
-  <p:clrMapOvr>
-    <a:masterClrMapping/>
-  </p:clrMapOvr>
-  <p:transition spd="med"/>
-</p:sld>
-</file>
-
 <file path=ppt/slides/slide37.xml><?xml version="1.0" encoding="utf-8"?>
 <p:sld xmlns:a="http://schemas.openxmlformats.org/drawingml/2006/main" xmlns:r="http://schemas.openxmlformats.org/officeDocument/2006/relationships" xmlns:p="http://schemas.openxmlformats.org/presentationml/2006/main">
   <p:cSld>
@@ -13135,8 +14126,8 @@
           <a:lstStyle/>
           <a:p>
             <a:r>
-              <a:rPr lang="en-US" b="1" dirty="0"/>
-              <a:t>NP</a:t>
+              <a:rPr lang="en-US" dirty="0"/>
+              <a:t>Decision Problem</a:t>
             </a:r>
           </a:p>
         </p:txBody>
@@ -13153,110 +14144,65 @@
         </p:nvSpPr>
         <p:spPr>
           <a:xfrm>
-            <a:off x="470263" y="2603500"/>
-            <a:ext cx="12261668" cy="6286500"/>
+            <a:off x="296091" y="2603499"/>
+            <a:ext cx="12557760" cy="6714671"/>
           </a:xfrm>
         </p:spPr>
         <p:txBody>
           <a:bodyPr>
-            <a:normAutofit fontScale="92500" lnSpcReduction="20000"/>
+            <a:normAutofit fontScale="77500" lnSpcReduction="20000"/>
           </a:bodyPr>
           <a:lstStyle/>
           <a:p>
             <a:r>
-              <a:rPr lang="en-US" b="1" dirty="0"/>
-              <a:t>NP</a:t>
-            </a:r>
-            <a:r>
-              <a:rPr lang="en-US" dirty="0"/>
-              <a:t>: “</a:t>
-            </a:r>
-            <a:r>
-              <a:rPr lang="en-US" b="1" dirty="0"/>
-              <a:t>N</a:t>
-            </a:r>
-            <a:r>
-              <a:rPr lang="en-US" dirty="0"/>
-              <a:t>ondeterministic </a:t>
-            </a:r>
-            <a:r>
-              <a:rPr lang="en-US" b="1" dirty="0"/>
-              <a:t>P</a:t>
-            </a:r>
-            <a:r>
-              <a:rPr lang="en-US" dirty="0"/>
-              <a:t>olynomial time”</a:t>
-            </a:r>
-          </a:p>
-          <a:p>
-            <a:r>
-              <a:rPr lang="en-US" b="1" dirty="0"/>
-              <a:t>NP</a:t>
-            </a:r>
-            <a:r>
-              <a:rPr lang="en-US" dirty="0"/>
-              <a:t> is “the set of all </a:t>
+              <a:rPr lang="en-US" dirty="0"/>
+              <a:t>Technically, QP is a </a:t>
             </a:r>
             <a:r>
               <a:rPr lang="en-US" i="1" dirty="0"/>
-              <a:t>decision </a:t>
-            </a:r>
-            <a:r>
-              <a:rPr lang="en-US" dirty="0"/>
-              <a:t>problems that can be solved in polynomial time on a theoretical non-deterministic Turing machine”</a:t>
-            </a:r>
-          </a:p>
-          <a:p>
-            <a:r>
-              <a:rPr lang="en-US" dirty="0"/>
-              <a:t>Equivalent, easier definition: “</a:t>
-            </a:r>
-            <a:r>
-              <a:rPr lang="en-US" i="1" dirty="0"/>
-              <a:t>set of all decision problems whose solutions can be verified in polynomial time</a:t>
-            </a:r>
-            <a:r>
-              <a:rPr lang="en-US" dirty="0"/>
-              <a:t>”</a:t>
-            </a:r>
-          </a:p>
-          <a:p>
-            <a:pPr lvl="1"/>
+              <a:t>decision</a:t>
+            </a:r>
+            <a:r>
+              <a:rPr lang="en-US" dirty="0"/>
+              <a:t> problem</a:t>
+            </a:r>
+          </a:p>
+          <a:p>
+            <a:r>
+              <a:rPr lang="en-US" dirty="0"/>
+              <a:t>Once we find a solution with N queens no threating any other, we know we have found a global optimum</a:t>
+            </a:r>
+          </a:p>
+          <a:p>
+            <a:r>
+              <a:rPr lang="en-US" dirty="0"/>
+              <a:t>In optimization problems, usually we cannot know if we found the best</a:t>
+            </a:r>
+          </a:p>
+          <a:p>
+            <a:r>
+              <a:rPr lang="en-US" dirty="0"/>
+              <a:t>Decision Problem: can say “yes” or “no” about if a solution is optimal or not</a:t>
+            </a:r>
+          </a:p>
+          <a:p>
+            <a:r>
+              <a:rPr lang="en-US" dirty="0"/>
+              <a:t>For decision problems, still doing the same as optimization, only difference is that we can know when best solution is found</a:t>
+            </a:r>
+          </a:p>
+          <a:p>
+            <a:r>
+              <a:rPr lang="en-US" dirty="0"/>
+              <a:t>Practically all optimization problems have a decision variant for some metric K, </a:t>
+            </a:r>
             <a:r>
               <a:rPr lang="en-US" dirty="0" err="1"/>
-              <a:t>Ie</a:t>
-            </a:r>
-            <a:r>
-              <a:rPr lang="en-US" dirty="0"/>
-              <a:t>, can answer “yes” or “no” in polynomial time</a:t>
-            </a:r>
-          </a:p>
-          <a:p>
-            <a:r>
-              <a:rPr lang="en-US" dirty="0"/>
-              <a:t>KP and QP are in </a:t>
-            </a:r>
-            <a:r>
-              <a:rPr lang="en-US" b="1" dirty="0"/>
-              <a:t>NP</a:t>
-            </a:r>
-            <a:r>
-              <a:rPr lang="en-US" dirty="0"/>
-              <a:t>:</a:t>
-            </a:r>
-          </a:p>
-          <a:p>
-            <a:pPr lvl="1"/>
-            <a:r>
-              <a:rPr lang="en-US" dirty="0"/>
-              <a:t>QP: can quickly verify if N queens do not threaten each other</a:t>
-            </a:r>
-          </a:p>
-          <a:p>
-            <a:pPr lvl="1"/>
-            <a:r>
-              <a:rPr lang="en-US" dirty="0"/>
-              <a:t>KP: can quickly verify in linear time if a solution has at least a certain value </a:t>
+              <a:t>eg</a:t>
+            </a:r>
+            <a:r>
+              <a:rPr lang="en-US" dirty="0"/>
+              <a:t> “find knapsack configuration with total item values of at least K”</a:t>
             </a:r>
           </a:p>
         </p:txBody>
@@ -13264,7 +14210,7 @@
     </p:spTree>
     <p:extLst>
       <p:ext uri="{BB962C8B-B14F-4D97-AF65-F5344CB8AC3E}">
-        <p14:creationId xmlns:p14="http://schemas.microsoft.com/office/powerpoint/2010/main" val="1762231097"/>
+        <p14:creationId xmlns:p14="http://schemas.microsoft.com/office/powerpoint/2010/main" val="63164798"/>
       </p:ext>
     </p:extLst>
   </p:cSld>
@@ -13309,7 +14255,7 @@
           <a:p>
             <a:r>
               <a:rPr lang="en-US" b="1" dirty="0"/>
-              <a:t>P</a:t>
+              <a:t>NP</a:t>
             </a:r>
           </a:p>
         </p:txBody>
@@ -13326,8 +14272,8 @@
         </p:nvSpPr>
         <p:spPr>
           <a:xfrm>
-            <a:off x="271417" y="2229031"/>
-            <a:ext cx="12461966" cy="7150099"/>
+            <a:off x="470263" y="2603500"/>
+            <a:ext cx="12261668" cy="6286500"/>
           </a:xfrm>
         </p:spPr>
         <p:txBody>
@@ -13338,76 +14284,106 @@
           <a:p>
             <a:r>
               <a:rPr lang="en-US" b="1" dirty="0"/>
-              <a:t>P</a:t>
-            </a:r>
-            <a:r>
-              <a:rPr lang="en-US" dirty="0"/>
-              <a:t> is the set of all decision problems that can be </a:t>
-            </a:r>
-            <a:r>
-              <a:rPr lang="en-US" i="1" dirty="0"/>
-              <a:t>solved</a:t>
-            </a:r>
-            <a:r>
-              <a:rPr lang="en-US" dirty="0"/>
-              <a:t> in polynomial time</a:t>
-            </a:r>
-          </a:p>
-          <a:p>
+              <a:t>NP</a:t>
+            </a:r>
+            <a:r>
+              <a:rPr lang="en-US" dirty="0"/>
+              <a:t>: “</a:t>
+            </a:r>
+            <a:r>
+              <a:rPr lang="en-US" b="1" dirty="0"/>
+              <a:t>N</a:t>
+            </a:r>
+            <a:r>
+              <a:rPr lang="en-US" dirty="0"/>
+              <a:t>ondeterministic </a:t>
+            </a:r>
             <a:r>
               <a:rPr lang="en-US" b="1" dirty="0"/>
               <a:t>P</a:t>
             </a:r>
             <a:r>
               <a:rPr lang="en-US" dirty="0"/>
-              <a:t> is at least a subset of </a:t>
-            </a:r>
+              <a:t>olynomial time”</a:t>
+            </a:r>
+          </a:p>
+          <a:p>
             <a:r>
               <a:rPr lang="en-US" b="1" dirty="0"/>
               <a:t>NP</a:t>
             </a:r>
             <a:r>
               <a:rPr lang="en-US" dirty="0"/>
-              <a:t>… but is it a strict subset???</a:t>
-            </a:r>
-          </a:p>
-          <a:p>
+              <a:t> is “the set of all </a:t>
+            </a:r>
+            <a:r>
+              <a:rPr lang="en-US" i="1" dirty="0"/>
+              <a:t>decision </a:t>
+            </a:r>
+            <a:r>
+              <a:rPr lang="en-US" dirty="0"/>
+              <a:t>problems that can be solved in polynomial time on a theoretical non-deterministic Turing machine”</a:t>
+            </a:r>
+          </a:p>
+          <a:p>
+            <a:r>
+              <a:rPr lang="en-US" dirty="0"/>
+              <a:t>Equivalent, easier definition: “</a:t>
+            </a:r>
+            <a:r>
+              <a:rPr lang="en-US" i="1" dirty="0"/>
+              <a:t>set of all decision problems whose solutions can be verified in polynomial time</a:t>
+            </a:r>
+            <a:r>
+              <a:rPr lang="en-US" dirty="0"/>
+              <a:t>”</a:t>
+            </a:r>
+          </a:p>
+          <a:p>
+            <a:pPr lvl="1"/>
+            <a:r>
+              <a:rPr lang="en-US" dirty="0" err="1"/>
+              <a:t>Ie</a:t>
+            </a:r>
+            <a:r>
+              <a:rPr lang="en-US" dirty="0"/>
+              <a:t>, can answer “yes” or “no” in polynomial time</a:t>
+            </a:r>
+          </a:p>
+          <a:p>
+            <a:r>
+              <a:rPr lang="en-US" dirty="0"/>
+              <a:t>KP and QP are in </a:t>
+            </a:r>
             <a:r>
               <a:rPr lang="en-US" b="1" dirty="0"/>
-              <a:t>P = NP ???</a:t>
-            </a:r>
-          </a:p>
-          <a:p>
-            <a:r>
-              <a:rPr lang="en-US" b="1" dirty="0"/>
-              <a:t>P != NP ???</a:t>
-            </a:r>
-          </a:p>
-          <a:p>
-            <a:r>
-              <a:rPr lang="en-US" i="1" dirty="0"/>
-              <a:t>This is arguably the most important question in computer science for which we do not have an answer (yet)</a:t>
-            </a:r>
-          </a:p>
-          <a:p>
-            <a:r>
-              <a:rPr lang="en-US" dirty="0"/>
-              <a:t>Consequence: there might be undiscovered, efficient algorithms to solve today’s complex problems, or those might be impossible to design… we simply have no clue </a:t>
-            </a:r>
-            <a:r>
-              <a:rPr lang="en-US" dirty="0">
-                <a:sym typeface="Wingdings" panose="05000000000000000000" pitchFamily="2" charset="2"/>
-              </a:rPr>
-              <a:t> </a:t>
-            </a:r>
-            <a:endParaRPr lang="en-US" dirty="0"/>
+              <a:t>NP</a:t>
+            </a:r>
+            <a:r>
+              <a:rPr lang="en-US" dirty="0"/>
+              <a:t>:</a:t>
+            </a:r>
+          </a:p>
+          <a:p>
+            <a:pPr lvl="1"/>
+            <a:r>
+              <a:rPr lang="en-US" dirty="0"/>
+              <a:t>QP: can quickly verify if N queens do not threaten each other</a:t>
+            </a:r>
+          </a:p>
+          <a:p>
+            <a:pPr lvl="1"/>
+            <a:r>
+              <a:rPr lang="en-US" dirty="0"/>
+              <a:t>KP: can quickly verify in linear time if a solution has at least a certain value </a:t>
+            </a:r>
           </a:p>
         </p:txBody>
       </p:sp>
     </p:spTree>
     <p:extLst>
       <p:ext uri="{BB962C8B-B14F-4D97-AF65-F5344CB8AC3E}">
-        <p14:creationId xmlns:p14="http://schemas.microsoft.com/office/powerpoint/2010/main" val="104883548"/>
+        <p14:creationId xmlns:p14="http://schemas.microsoft.com/office/powerpoint/2010/main" val="1762231097"/>
       </p:ext>
     </p:extLst>
   </p:cSld>
@@ -13451,8 +14427,8 @@
           <a:lstStyle/>
           <a:p>
             <a:r>
-              <a:rPr lang="en-US" dirty="0"/>
-              <a:t>Homework</a:t>
+              <a:rPr lang="en-US" b="1" dirty="0"/>
+              <a:t>P</a:t>
             </a:r>
           </a:p>
         </p:txBody>
@@ -13467,58 +14443,90 @@
             <p:ph type="body" idx="1"/>
           </p:nvPr>
         </p:nvSpPr>
-        <p:spPr/>
+        <p:spPr>
+          <a:xfrm>
+            <a:off x="271417" y="2229031"/>
+            <a:ext cx="12461966" cy="7150099"/>
+          </a:xfrm>
+        </p:spPr>
         <p:txBody>
-          <a:bodyPr/>
+          <a:bodyPr>
+            <a:normAutofit fontScale="92500" lnSpcReduction="20000"/>
+          </a:bodyPr>
           <a:lstStyle/>
           <a:p>
             <a:r>
-              <a:rPr lang="en-US" dirty="0"/>
-              <a:t>Study Book  pages 910-921</a:t>
-            </a:r>
-          </a:p>
-          <a:p>
-            <a:pPr lvl="1"/>
-            <a:r>
-              <a:rPr lang="en-US" dirty="0"/>
-              <a:t>Note: details of optimization algorithm are </a:t>
-            </a:r>
-            <a:r>
-              <a:rPr lang="en-US"/>
-              <a:t>not in the book</a:t>
+              <a:rPr lang="en-US" b="1" dirty="0"/>
+              <a:t>P</a:t>
+            </a:r>
+            <a:r>
+              <a:rPr lang="en-US" dirty="0"/>
+              <a:t> is the set of all decision problems that can be </a:t>
+            </a:r>
+            <a:r>
+              <a:rPr lang="en-US" i="1" dirty="0"/>
+              <a:t>solved</a:t>
+            </a:r>
+            <a:r>
+              <a:rPr lang="en-US" dirty="0"/>
+              <a:t> in polynomial time</a:t>
+            </a:r>
+          </a:p>
+          <a:p>
+            <a:r>
+              <a:rPr lang="en-US" b="1" dirty="0"/>
+              <a:t>P</a:t>
+            </a:r>
+            <a:r>
+              <a:rPr lang="en-US" dirty="0"/>
+              <a:t> is at least a subset of </a:t>
+            </a:r>
+            <a:r>
+              <a:rPr lang="en-US" b="1" dirty="0"/>
+              <a:t>NP</a:t>
+            </a:r>
+            <a:r>
+              <a:rPr lang="en-US" dirty="0"/>
+              <a:t>… but is it a strict subset???</a:t>
+            </a:r>
+          </a:p>
+          <a:p>
+            <a:r>
+              <a:rPr lang="en-US" b="1" dirty="0"/>
+              <a:t>P = NP ???</a:t>
+            </a:r>
+          </a:p>
+          <a:p>
+            <a:r>
+              <a:rPr lang="en-US" b="1" dirty="0"/>
+              <a:t>P != NP ???</a:t>
+            </a:r>
+          </a:p>
+          <a:p>
+            <a:r>
+              <a:rPr lang="en-US" i="1" dirty="0"/>
+              <a:t>This is arguably the most important question in computer science for which we do not have an answer (yet)</a:t>
+            </a:r>
+          </a:p>
+          <a:p>
+            <a:r>
+              <a:rPr lang="en-US" dirty="0"/>
+              <a:t>Consequence: there might be undiscovered, efficient algorithms to solve today’s complex problems, or those might be impossible to design… we simply have no clue </a:t>
+            </a:r>
+            <a:r>
+              <a:rPr lang="en-US" dirty="0">
+                <a:sym typeface="Wingdings" panose="05000000000000000000" pitchFamily="2" charset="2"/>
+              </a:rPr>
+              <a:t> </a:t>
             </a:r>
             <a:endParaRPr lang="en-US" dirty="0"/>
-          </a:p>
-          <a:p>
-            <a:r>
-              <a:rPr lang="en-US" dirty="0"/>
-              <a:t>Study code in the </a:t>
-            </a:r>
-            <a:r>
-              <a:rPr lang="en-US" i="1" dirty="0"/>
-              <a:t>org.pg4200.les10</a:t>
-            </a:r>
-            <a:r>
-              <a:rPr lang="en-US" dirty="0"/>
-              <a:t> package</a:t>
-            </a:r>
-          </a:p>
-          <a:p>
-            <a:r>
-              <a:rPr lang="en-US" dirty="0"/>
-              <a:t>Do exercises in </a:t>
-            </a:r>
-            <a:r>
-              <a:rPr lang="en-US" i="1" dirty="0"/>
-              <a:t>exercises/ex10</a:t>
-            </a:r>
           </a:p>
         </p:txBody>
       </p:sp>
     </p:spTree>
     <p:extLst>
       <p:ext uri="{BB962C8B-B14F-4D97-AF65-F5344CB8AC3E}">
-        <p14:creationId xmlns:p14="http://schemas.microsoft.com/office/powerpoint/2010/main" val="453965310"/>
+        <p14:creationId xmlns:p14="http://schemas.microsoft.com/office/powerpoint/2010/main" val="104883548"/>
       </p:ext>
     </p:extLst>
   </p:cSld>
@@ -13730,6 +14738,117 @@
     <p:extLst>
       <p:ext uri="{BB962C8B-B14F-4D97-AF65-F5344CB8AC3E}">
         <p14:creationId xmlns:p14="http://schemas.microsoft.com/office/powerpoint/2010/main" val="3178753017"/>
+      </p:ext>
+    </p:extLst>
+  </p:cSld>
+  <p:clrMapOvr>
+    <a:masterClrMapping/>
+  </p:clrMapOvr>
+  <p:transition spd="med"/>
+</p:sld>
+</file>
+
+<file path=ppt/slides/slide40.xml><?xml version="1.0" encoding="utf-8"?>
+<p:sld xmlns:a="http://schemas.openxmlformats.org/drawingml/2006/main" xmlns:r="http://schemas.openxmlformats.org/officeDocument/2006/relationships" xmlns:p="http://schemas.openxmlformats.org/presentationml/2006/main">
+  <p:cSld>
+    <p:spTree>
+      <p:nvGrpSpPr>
+        <p:cNvPr id="1" name=""/>
+        <p:cNvGrpSpPr/>
+        <p:nvPr/>
+      </p:nvGrpSpPr>
+      <p:grpSpPr>
+        <a:xfrm>
+          <a:off x="0" y="0"/>
+          <a:ext cx="0" cy="0"/>
+          <a:chOff x="0" y="0"/>
+          <a:chExt cx="0" cy="0"/>
+        </a:xfrm>
+      </p:grpSpPr>
+      <p:sp>
+        <p:nvSpPr>
+          <p:cNvPr id="2" name="Title 1"/>
+          <p:cNvSpPr>
+            <a:spLocks noGrp="1"/>
+          </p:cNvSpPr>
+          <p:nvPr>
+            <p:ph type="title"/>
+          </p:nvPr>
+        </p:nvSpPr>
+        <p:spPr/>
+        <p:txBody>
+          <a:bodyPr/>
+          <a:lstStyle/>
+          <a:p>
+            <a:r>
+              <a:rPr lang="en-US" dirty="0"/>
+              <a:t>Homework</a:t>
+            </a:r>
+          </a:p>
+        </p:txBody>
+      </p:sp>
+      <p:sp>
+        <p:nvSpPr>
+          <p:cNvPr id="3" name="Text Placeholder 2"/>
+          <p:cNvSpPr>
+            <a:spLocks noGrp="1"/>
+          </p:cNvSpPr>
+          <p:nvPr>
+            <p:ph type="body" idx="1"/>
+          </p:nvPr>
+        </p:nvSpPr>
+        <p:spPr/>
+        <p:txBody>
+          <a:bodyPr/>
+          <a:lstStyle/>
+          <a:p>
+            <a:r>
+              <a:rPr lang="en-US" dirty="0"/>
+              <a:t>Study Book  pages 910-921</a:t>
+            </a:r>
+          </a:p>
+          <a:p>
+            <a:pPr lvl="1"/>
+            <a:r>
+              <a:rPr lang="en-US" dirty="0"/>
+              <a:t>Note: details of optimization algorithm are </a:t>
+            </a:r>
+            <a:r>
+              <a:rPr lang="en-US"/>
+              <a:t>not in the book</a:t>
+            </a:r>
+            <a:endParaRPr lang="en-US" dirty="0"/>
+          </a:p>
+          <a:p>
+            <a:r>
+              <a:rPr lang="en-US" dirty="0"/>
+              <a:t>Study code in the </a:t>
+            </a:r>
+            <a:r>
+              <a:rPr lang="en-US" i="1" dirty="0"/>
+              <a:t>org.pg4200.les10</a:t>
+            </a:r>
+            <a:r>
+              <a:rPr lang="en-US" dirty="0"/>
+              <a:t> package</a:t>
+            </a:r>
+          </a:p>
+          <a:p>
+            <a:r>
+              <a:rPr lang="en-US" dirty="0"/>
+              <a:t>Do exercises in </a:t>
+            </a:r>
+            <a:r>
+              <a:rPr lang="en-US" i="1" dirty="0"/>
+              <a:t>exercises/ex10</a:t>
+            </a:r>
+          </a:p>
+        </p:txBody>
+      </p:sp>
+    </p:spTree>
+    <p:extLst>
+      <p:ext uri="{BB962C8B-B14F-4D97-AF65-F5344CB8AC3E}">
+        <p14:creationId xmlns:p14="http://schemas.microsoft.com/office/powerpoint/2010/main" val="453965310"/>
       </p:ext>
     </p:extLst>
   </p:cSld>

</xml_diff>